<commit_message>
added day 2 sql demos
</commit_message>
<xml_diff>
--- a/SQL_PLSQL/slides/Day 1.pptx
+++ b/SQL_PLSQL/slides/Day 1.pptx
@@ -270,7 +270,7 @@
           <a:p>
             <a:fld id="{A4FA03A4-DAA5-4E5E-AB6B-E057E15D351D}" type="datetimeFigureOut">
               <a:rPr lang="en-US" smtClean="0"/>
-              <a:t>5/13/2021</a:t>
+              <a:t>5/14/2021</a:t>
             </a:fld>
             <a:endParaRPr lang="en-US"/>
           </a:p>
@@ -468,7 +468,7 @@
           <a:p>
             <a:fld id="{A4FA03A4-DAA5-4E5E-AB6B-E057E15D351D}" type="datetimeFigureOut">
               <a:rPr lang="en-US" smtClean="0"/>
-              <a:t>5/13/2021</a:t>
+              <a:t>5/14/2021</a:t>
             </a:fld>
             <a:endParaRPr lang="en-US"/>
           </a:p>
@@ -676,7 +676,7 @@
           <a:p>
             <a:fld id="{A4FA03A4-DAA5-4E5E-AB6B-E057E15D351D}" type="datetimeFigureOut">
               <a:rPr lang="en-US" smtClean="0"/>
-              <a:t>5/13/2021</a:t>
+              <a:t>5/14/2021</a:t>
             </a:fld>
             <a:endParaRPr lang="en-US"/>
           </a:p>
@@ -874,7 +874,7 @@
           <a:p>
             <a:fld id="{A4FA03A4-DAA5-4E5E-AB6B-E057E15D351D}" type="datetimeFigureOut">
               <a:rPr lang="en-US" smtClean="0"/>
-              <a:t>5/13/2021</a:t>
+              <a:t>5/14/2021</a:t>
             </a:fld>
             <a:endParaRPr lang="en-US"/>
           </a:p>
@@ -1149,7 +1149,7 @@
           <a:p>
             <a:fld id="{A4FA03A4-DAA5-4E5E-AB6B-E057E15D351D}" type="datetimeFigureOut">
               <a:rPr lang="en-US" smtClean="0"/>
-              <a:t>5/13/2021</a:t>
+              <a:t>5/14/2021</a:t>
             </a:fld>
             <a:endParaRPr lang="en-US"/>
           </a:p>
@@ -1414,7 +1414,7 @@
           <a:p>
             <a:fld id="{A4FA03A4-DAA5-4E5E-AB6B-E057E15D351D}" type="datetimeFigureOut">
               <a:rPr lang="en-US" smtClean="0"/>
-              <a:t>5/13/2021</a:t>
+              <a:t>5/14/2021</a:t>
             </a:fld>
             <a:endParaRPr lang="en-US"/>
           </a:p>
@@ -1826,7 +1826,7 @@
           <a:p>
             <a:fld id="{A4FA03A4-DAA5-4E5E-AB6B-E057E15D351D}" type="datetimeFigureOut">
               <a:rPr lang="en-US" smtClean="0"/>
-              <a:t>5/13/2021</a:t>
+              <a:t>5/14/2021</a:t>
             </a:fld>
             <a:endParaRPr lang="en-US"/>
           </a:p>
@@ -1967,7 +1967,7 @@
           <a:p>
             <a:fld id="{A4FA03A4-DAA5-4E5E-AB6B-E057E15D351D}" type="datetimeFigureOut">
               <a:rPr lang="en-US" smtClean="0"/>
-              <a:t>5/13/2021</a:t>
+              <a:t>5/14/2021</a:t>
             </a:fld>
             <a:endParaRPr lang="en-US"/>
           </a:p>
@@ -2080,7 +2080,7 @@
           <a:p>
             <a:fld id="{A4FA03A4-DAA5-4E5E-AB6B-E057E15D351D}" type="datetimeFigureOut">
               <a:rPr lang="en-US" smtClean="0"/>
-              <a:t>5/13/2021</a:t>
+              <a:t>5/14/2021</a:t>
             </a:fld>
             <a:endParaRPr lang="en-US"/>
           </a:p>
@@ -2391,7 +2391,7 @@
           <a:p>
             <a:fld id="{A4FA03A4-DAA5-4E5E-AB6B-E057E15D351D}" type="datetimeFigureOut">
               <a:rPr lang="en-US" smtClean="0"/>
-              <a:t>5/13/2021</a:t>
+              <a:t>5/14/2021</a:t>
             </a:fld>
             <a:endParaRPr lang="en-US"/>
           </a:p>
@@ -2679,7 +2679,7 @@
           <a:p>
             <a:fld id="{A4FA03A4-DAA5-4E5E-AB6B-E057E15D351D}" type="datetimeFigureOut">
               <a:rPr lang="en-US" smtClean="0"/>
-              <a:t>5/13/2021</a:t>
+              <a:t>5/14/2021</a:t>
             </a:fld>
             <a:endParaRPr lang="en-US"/>
           </a:p>
@@ -2920,7 +2920,7 @@
           <a:p>
             <a:fld id="{A4FA03A4-DAA5-4E5E-AB6B-E057E15D351D}" type="datetimeFigureOut">
               <a:rPr lang="en-US" smtClean="0"/>
-              <a:t>5/13/2021</a:t>
+              <a:t>5/14/2021</a:t>
             </a:fld>
             <a:endParaRPr lang="en-US"/>
           </a:p>
@@ -3768,6 +3768,27 @@
           <a:bodyPr/>
           <a:lstStyle/>
           <a:p>
+            <a:r>
+              <a:rPr lang="en-US" b="0" i="0" u="sng">
+                <a:solidFill>
+                  <a:srgbClr val="3367D6"/>
+                </a:solidFill>
+                <a:effectLst/>
+                <a:latin typeface="Roboto" panose="02000000000000000000" pitchFamily="2" charset="0"/>
+                <a:hlinkClick r:id="rId2"/>
+              </a:rPr>
+              <a:t>https://professionalcoders.slack.com/join/shared_invite/zt-pymoh575-UzhQVi5Mdwajlwvue1A0DA#/</a:t>
+            </a:r>
+            <a:r>
+              <a:rPr lang="en-US" b="0" i="0" u="sng">
+                <a:solidFill>
+                  <a:srgbClr val="3367D6"/>
+                </a:solidFill>
+                <a:effectLst/>
+                <a:latin typeface="Roboto" panose="02000000000000000000" pitchFamily="2" charset="0"/>
+              </a:rPr>
+              <a:t> </a:t>
+            </a:r>
             <a:endParaRPr lang="en-US"/>
           </a:p>
         </p:txBody>
@@ -4413,7 +4434,11 @@
           <a:p>
             <a:pPr lvl="1"/>
             <a:r>
-              <a:rPr lang="en-US" dirty="0"/>
+              <a:rPr lang="en-US" dirty="0">
+                <a:highlight>
+                  <a:srgbClr val="FFFF00"/>
+                </a:highlight>
+              </a:rPr>
               <a:t>Oracle</a:t>
             </a:r>
           </a:p>
@@ -4436,8 +4461,16 @@
           <a:p>
             <a:pPr lvl="1"/>
             <a:r>
-              <a:rPr lang="en-US" dirty="0"/>
-              <a:t>Oracle SQL developer / SQL Plus</a:t>
+              <a:rPr lang="en-US" dirty="0">
+                <a:highlight>
+                  <a:srgbClr val="FFFF00"/>
+                </a:highlight>
+              </a:rPr>
+              <a:t>Oracle SQL developer </a:t>
+            </a:r>
+            <a:r>
+              <a:rPr lang="en-US" dirty="0"/>
+              <a:t>/ SQL Plus</a:t>
             </a:r>
           </a:p>
           <a:p>

</xml_diff>